<commit_message>
Version that got submitted
</commit_message>
<xml_diff>
--- a/paper/figures/diagrams.pptx
+++ b/paper/figures/diagrams.pptx
@@ -672,7 +672,7 @@
                 </a:solidFill>
               </a:rPr>
               <a:pPr/>
-              <a:t>1/16/17</a:t>
+              <a:t>1/20/17</a:t>
             </a:fld>
             <a:endParaRPr lang="en-US">
               <a:solidFill>
@@ -874,7 +874,7 @@
                 </a:solidFill>
               </a:rPr>
               <a:pPr/>
-              <a:t>1/16/17</a:t>
+              <a:t>1/20/17</a:t>
             </a:fld>
             <a:endParaRPr lang="en-US">
               <a:solidFill>
@@ -1086,7 +1086,7 @@
                 </a:solidFill>
               </a:rPr>
               <a:pPr/>
-              <a:t>1/16/17</a:t>
+              <a:t>1/20/17</a:t>
             </a:fld>
             <a:endParaRPr lang="en-US">
               <a:solidFill>
@@ -1288,7 +1288,7 @@
                 </a:solidFill>
               </a:rPr>
               <a:pPr/>
-              <a:t>1/16/17</a:t>
+              <a:t>1/20/17</a:t>
             </a:fld>
             <a:endParaRPr lang="en-US">
               <a:solidFill>
@@ -1566,7 +1566,7 @@
                 </a:solidFill>
               </a:rPr>
               <a:pPr/>
-              <a:t>1/16/17</a:t>
+              <a:t>1/20/17</a:t>
             </a:fld>
             <a:endParaRPr lang="en-US">
               <a:solidFill>
@@ -1886,7 +1886,7 @@
                 </a:solidFill>
               </a:rPr>
               <a:pPr/>
-              <a:t>1/16/17</a:t>
+              <a:t>1/20/17</a:t>
             </a:fld>
             <a:endParaRPr lang="en-US">
               <a:solidFill>
@@ -2340,7 +2340,7 @@
                 </a:solidFill>
               </a:rPr>
               <a:pPr/>
-              <a:t>1/16/17</a:t>
+              <a:t>1/20/17</a:t>
             </a:fld>
             <a:endParaRPr lang="en-US">
               <a:solidFill>
@@ -2490,7 +2490,7 @@
                 </a:solidFill>
               </a:rPr>
               <a:pPr/>
-              <a:t>1/16/17</a:t>
+              <a:t>1/20/17</a:t>
             </a:fld>
             <a:endParaRPr lang="en-US">
               <a:solidFill>
@@ -2617,7 +2617,7 @@
                 </a:solidFill>
               </a:rPr>
               <a:pPr/>
-              <a:t>1/16/17</a:t>
+              <a:t>1/20/17</a:t>
             </a:fld>
             <a:endParaRPr lang="en-US">
               <a:solidFill>
@@ -2926,7 +2926,7 @@
                 </a:solidFill>
               </a:rPr>
               <a:pPr/>
-              <a:t>1/16/17</a:t>
+              <a:t>1/20/17</a:t>
             </a:fld>
             <a:endParaRPr lang="en-US">
               <a:solidFill>
@@ -3215,7 +3215,7 @@
                 </a:solidFill>
               </a:rPr>
               <a:pPr/>
-              <a:t>1/16/17</a:t>
+              <a:t>1/20/17</a:t>
             </a:fld>
             <a:endParaRPr lang="en-US">
               <a:solidFill>
@@ -3464,7 +3464,7 @@
                 <a:ea typeface="+mn-ea"/>
               </a:rPr>
               <a:pPr defTabSz="2194560"/>
-              <a:t>1/16/17</a:t>
+              <a:t>1/20/17</a:t>
             </a:fld>
             <a:endParaRPr lang="en-US" kern="1200">
               <a:solidFill>
@@ -6778,27 +6778,309 @@
       </p:grpSpPr>
       <p:grpSp>
         <p:nvGrpSpPr>
-          <p:cNvPr id="127" name="Group 126"/>
+          <p:cNvPr id="6" name="Group 5"/>
           <p:cNvGrpSpPr/>
           <p:nvPr/>
         </p:nvGrpSpPr>
         <p:grpSpPr>
           <a:xfrm>
-            <a:off x="4646287" y="2350565"/>
-            <a:ext cx="4327570" cy="4854226"/>
-            <a:chOff x="6702562" y="2494773"/>
-            <a:chExt cx="4758631" cy="5252477"/>
+            <a:off x="-287325" y="158384"/>
+            <a:ext cx="33000503" cy="11367645"/>
+            <a:chOff x="-287325" y="158384"/>
+            <a:chExt cx="33000503" cy="11367645"/>
           </a:xfrm>
         </p:grpSpPr>
+        <p:grpSp>
+          <p:nvGrpSpPr>
+            <p:cNvPr id="127" name="Group 126"/>
+            <p:cNvGrpSpPr/>
+            <p:nvPr/>
+          </p:nvGrpSpPr>
+          <p:grpSpPr>
+            <a:xfrm>
+              <a:off x="4646287" y="2350565"/>
+              <a:ext cx="4327570" cy="4854226"/>
+              <a:chOff x="6702562" y="2494773"/>
+              <a:chExt cx="4758631" cy="5252477"/>
+            </a:xfrm>
+          </p:grpSpPr>
+          <p:pic>
+            <p:nvPicPr>
+              <p:cNvPr id="52" name="Shape 96"/>
+              <p:cNvPicPr preferRelativeResize="0"/>
+              <p:nvPr/>
+            </p:nvPicPr>
+            <p:blipFill>
+              <a:blip r:embed="rId2">
+                <a:alphaModFix/>
+              </a:blip>
+              <a:stretch>
+                <a:fillRect/>
+              </a:stretch>
+            </p:blipFill>
+            <p:spPr>
+              <a:xfrm>
+                <a:off x="6702562" y="2494773"/>
+                <a:ext cx="3262743" cy="3007155"/>
+              </a:xfrm>
+              <a:prstGeom prst="rect">
+                <a:avLst/>
+              </a:prstGeom>
+              <a:noFill/>
+              <a:ln>
+                <a:noFill/>
+              </a:ln>
+            </p:spPr>
+          </p:pic>
+          <p:pic>
+            <p:nvPicPr>
+              <p:cNvPr id="62" name="Picture 61"/>
+              <p:cNvPicPr>
+                <a:picLocks noChangeAspect="1"/>
+              </p:cNvPicPr>
+              <p:nvPr/>
+            </p:nvPicPr>
+            <p:blipFill>
+              <a:blip r:embed="rId3"/>
+              <a:stretch>
+                <a:fillRect/>
+              </a:stretch>
+            </p:blipFill>
+            <p:spPr>
+              <a:xfrm>
+                <a:off x="8474027" y="5501928"/>
+                <a:ext cx="1948479" cy="2245322"/>
+              </a:xfrm>
+              <a:prstGeom prst="rect">
+                <a:avLst/>
+              </a:prstGeom>
+            </p:spPr>
+          </p:pic>
+          <p:pic>
+            <p:nvPicPr>
+              <p:cNvPr id="63" name="Picture 62"/>
+              <p:cNvPicPr>
+                <a:picLocks noChangeAspect="1"/>
+              </p:cNvPicPr>
+              <p:nvPr/>
+            </p:nvPicPr>
+            <p:blipFill>
+              <a:blip r:embed="rId4"/>
+              <a:stretch>
+                <a:fillRect/>
+              </a:stretch>
+            </p:blipFill>
+            <p:spPr>
+              <a:xfrm>
+                <a:off x="9383818" y="3449899"/>
+                <a:ext cx="2077375" cy="1919492"/>
+              </a:xfrm>
+              <a:prstGeom prst="rect">
+                <a:avLst/>
+              </a:prstGeom>
+            </p:spPr>
+          </p:pic>
+        </p:grpSp>
+        <p:grpSp>
+          <p:nvGrpSpPr>
+            <p:cNvPr id="3" name="Group 2"/>
+            <p:cNvGrpSpPr/>
+            <p:nvPr/>
+          </p:nvGrpSpPr>
+          <p:grpSpPr>
+            <a:xfrm>
+              <a:off x="21565213" y="158384"/>
+              <a:ext cx="11147965" cy="4640307"/>
+              <a:chOff x="20650813" y="158384"/>
+              <a:chExt cx="11147965" cy="4640307"/>
+            </a:xfrm>
+          </p:grpSpPr>
+          <p:sp>
+            <p:nvSpPr>
+              <p:cNvPr id="2" name="Cloud 1"/>
+              <p:cNvSpPr/>
+              <p:nvPr/>
+            </p:nvSpPr>
+            <p:spPr>
+              <a:xfrm>
+                <a:off x="20650813" y="158384"/>
+                <a:ext cx="11147965" cy="4640307"/>
+              </a:xfrm>
+              <a:prstGeom prst="cloud">
+                <a:avLst/>
+              </a:prstGeom>
+              <a:noFill/>
+            </p:spPr>
+            <p:style>
+              <a:lnRef idx="2">
+                <a:schemeClr val="dk1"/>
+              </a:lnRef>
+              <a:fillRef idx="1">
+                <a:schemeClr val="lt1"/>
+              </a:fillRef>
+              <a:effectRef idx="0">
+                <a:schemeClr val="dk1"/>
+              </a:effectRef>
+              <a:fontRef idx="minor">
+                <a:schemeClr val="dk1"/>
+              </a:fontRef>
+            </p:style>
+            <p:txBody>
+              <a:bodyPr rtlCol="0" anchor="ctr"/>
+              <a:lstStyle/>
+              <a:p>
+                <a:pPr algn="ctr"/>
+                <a:endParaRPr lang="en-US"/>
+              </a:p>
+            </p:txBody>
+          </p:sp>
+          <p:pic>
+            <p:nvPicPr>
+              <p:cNvPr id="60" name="Picture 4" descr="Chameleon"/>
+              <p:cNvPicPr>
+                <a:picLocks noChangeAspect="1" noChangeArrowheads="1"/>
+              </p:cNvPicPr>
+              <p:nvPr/>
+            </p:nvPicPr>
+            <p:blipFill>
+              <a:blip r:embed="rId5">
+                <a:extLst>
+                  <a:ext uri="{28A0092B-C50C-407E-A947-70E740481C1C}">
+                    <a14:useLocalDpi xmlns:a14="http://schemas.microsoft.com/office/drawing/2010/main" val="0"/>
+                  </a:ext>
+                </a:extLst>
+              </a:blip>
+              <a:srcRect/>
+              <a:stretch>
+                <a:fillRect/>
+              </a:stretch>
+            </p:blipFill>
+            <p:spPr bwMode="auto">
+              <a:xfrm>
+                <a:off x="21507955" y="950834"/>
+                <a:ext cx="5321876" cy="1524227"/>
+              </a:xfrm>
+              <a:prstGeom prst="rect">
+                <a:avLst/>
+              </a:prstGeom>
+              <a:noFill/>
+              <a:extLst>
+                <a:ext uri="{909E8E84-426E-40dd-AFC4-6F175D3DCCD1}">
+                  <a14:hiddenFill xmlns:a14="http://schemas.microsoft.com/office/drawing/2010/main">
+                    <a:solidFill>
+                      <a:srgbClr val="FFFFFF"/>
+                    </a:solidFill>
+                  </a14:hiddenFill>
+                </a:ext>
+              </a:extLst>
+            </p:spPr>
+          </p:pic>
+          <p:pic>
+            <p:nvPicPr>
+              <p:cNvPr id="61" name="Picture 2" descr="CloudLab"/>
+              <p:cNvPicPr>
+                <a:picLocks noChangeAspect="1" noChangeArrowheads="1"/>
+              </p:cNvPicPr>
+              <p:nvPr/>
+            </p:nvPicPr>
+            <p:blipFill>
+              <a:blip r:embed="rId6" cstate="print">
+                <a:extLst>
+                  <a:ext uri="{28A0092B-C50C-407E-A947-70E740481C1C}">
+                    <a14:useLocalDpi xmlns:a14="http://schemas.microsoft.com/office/drawing/2010/main" val="0"/>
+                  </a:ext>
+                </a:extLst>
+              </a:blip>
+              <a:srcRect/>
+              <a:stretch>
+                <a:fillRect/>
+              </a:stretch>
+            </p:blipFill>
+            <p:spPr bwMode="auto">
+              <a:xfrm>
+                <a:off x="21711155" y="2494987"/>
+                <a:ext cx="5321879" cy="925298"/>
+              </a:xfrm>
+              <a:prstGeom prst="rect">
+                <a:avLst/>
+              </a:prstGeom>
+              <a:noFill/>
+              <a:extLst>
+                <a:ext uri="{909E8E84-426E-40dd-AFC4-6F175D3DCCD1}">
+                  <a14:hiddenFill xmlns:a14="http://schemas.microsoft.com/office/drawing/2010/main">
+                    <a:solidFill>
+                      <a:srgbClr val="FFFFFF"/>
+                    </a:solidFill>
+                  </a14:hiddenFill>
+                </a:ext>
+              </a:extLst>
+            </p:spPr>
+          </p:pic>
+          <p:pic>
+            <p:nvPicPr>
+              <p:cNvPr id="4" name="Picture 3"/>
+              <p:cNvPicPr>
+                <a:picLocks noChangeAspect="1"/>
+              </p:cNvPicPr>
+              <p:nvPr/>
+            </p:nvPicPr>
+            <p:blipFill>
+              <a:blip r:embed="rId7"/>
+              <a:stretch>
+                <a:fillRect/>
+              </a:stretch>
+            </p:blipFill>
+            <p:spPr>
+              <a:xfrm>
+                <a:off x="26728231" y="1798076"/>
+                <a:ext cx="3487820" cy="2615865"/>
+              </a:xfrm>
+              <a:prstGeom prst="rect">
+                <a:avLst/>
+              </a:prstGeom>
+            </p:spPr>
+          </p:pic>
+          <p:pic>
+            <p:nvPicPr>
+              <p:cNvPr id="5" name="Picture 4"/>
+              <p:cNvPicPr>
+                <a:picLocks noChangeAspect="1"/>
+              </p:cNvPicPr>
+              <p:nvPr/>
+            </p:nvPicPr>
+            <p:blipFill>
+              <a:blip r:embed="rId8"/>
+              <a:stretch>
+                <a:fillRect/>
+              </a:stretch>
+            </p:blipFill>
+            <p:spPr>
+              <a:xfrm>
+                <a:off x="26728234" y="559673"/>
+                <a:ext cx="4057495" cy="1525618"/>
+              </a:xfrm>
+              <a:prstGeom prst="rect">
+                <a:avLst/>
+              </a:prstGeom>
+            </p:spPr>
+          </p:pic>
+        </p:grpSp>
         <p:pic>
           <p:nvPicPr>
-            <p:cNvPr id="52" name="Shape 96"/>
+            <p:cNvPr id="69" name="Shape 62"/>
             <p:cNvPicPr preferRelativeResize="0"/>
             <p:nvPr/>
           </p:nvPicPr>
           <p:blipFill>
-            <a:blip r:embed="rId2">
+            <a:blip r:embed="rId9">
               <a:alphaModFix/>
+              <a:duotone>
+                <a:prstClr val="black"/>
+                <a:prstClr val="white">
+                  <a:tint val="45000"/>
+                  <a:satMod val="400000"/>
+                </a:prstClr>
+              </a:duotone>
             </a:blip>
             <a:stretch>
               <a:fillRect/>
@@ -6806,8 +7088,8 @@
           </p:blipFill>
           <p:spPr>
             <a:xfrm>
-              <a:off x="6702562" y="2494773"/>
-              <a:ext cx="3262743" cy="3007155"/>
+              <a:off x="-287325" y="5369391"/>
+              <a:ext cx="5384800" cy="4522358"/>
             </a:xfrm>
             <a:prstGeom prst="rect">
               <a:avLst/>
@@ -6818,24 +7100,257 @@
             </a:ln>
           </p:spPr>
         </p:pic>
+        <p:cxnSp>
+          <p:nvCxnSpPr>
+            <p:cNvPr id="70" name="Shape 60"/>
+            <p:cNvCxnSpPr/>
+            <p:nvPr/>
+          </p:nvCxnSpPr>
+          <p:spPr>
+            <a:xfrm flipV="1">
+              <a:off x="3812331" y="5369391"/>
+              <a:ext cx="1928069" cy="1197346"/>
+            </a:xfrm>
+            <a:prstGeom prst="straightConnector1">
+              <a:avLst/>
+            </a:prstGeom>
+            <a:noFill/>
+            <a:ln w="101600" cap="flat" cmpd="sng">
+              <a:solidFill>
+                <a:schemeClr val="tx1"/>
+              </a:solidFill>
+              <a:prstDash val="solid"/>
+              <a:round/>
+              <a:headEnd type="none" w="lg" len="lg"/>
+              <a:tailEnd type="triangle" w="lg" len="lg"/>
+            </a:ln>
+          </p:spPr>
+        </p:cxnSp>
+        <p:grpSp>
+          <p:nvGrpSpPr>
+            <p:cNvPr id="9" name="Group 8"/>
+            <p:cNvGrpSpPr/>
+            <p:nvPr/>
+          </p:nvGrpSpPr>
+          <p:grpSpPr>
+            <a:xfrm>
+              <a:off x="10208108" y="1130732"/>
+              <a:ext cx="6858000" cy="4877417"/>
+              <a:chOff x="12750800" y="21076818"/>
+              <a:chExt cx="6858000" cy="4877417"/>
+            </a:xfrm>
+          </p:grpSpPr>
+          <p:pic>
+            <p:nvPicPr>
+              <p:cNvPr id="83" name="Picture 82"/>
+              <p:cNvPicPr>
+                <a:picLocks noChangeAspect="1"/>
+              </p:cNvPicPr>
+              <p:nvPr/>
+            </p:nvPicPr>
+            <p:blipFill>
+              <a:blip r:embed="rId10"/>
+              <a:stretch>
+                <a:fillRect/>
+              </a:stretch>
+            </p:blipFill>
+            <p:spPr>
+              <a:xfrm>
+                <a:off x="14354239" y="21076818"/>
+                <a:ext cx="3664563" cy="3667960"/>
+              </a:xfrm>
+              <a:prstGeom prst="rect">
+                <a:avLst/>
+              </a:prstGeom>
+            </p:spPr>
+          </p:pic>
+          <p:pic>
+            <p:nvPicPr>
+              <p:cNvPr id="84" name="Shape 56"/>
+              <p:cNvPicPr preferRelativeResize="0"/>
+              <p:nvPr/>
+            </p:nvPicPr>
+            <p:blipFill>
+              <a:blip r:embed="rId11">
+                <a:alphaModFix/>
+              </a:blip>
+              <a:stretch>
+                <a:fillRect/>
+              </a:stretch>
+            </p:blipFill>
+            <p:spPr>
+              <a:xfrm>
+                <a:off x="15221605" y="22418623"/>
+                <a:ext cx="1929828" cy="1911682"/>
+              </a:xfrm>
+              <a:prstGeom prst="rect">
+                <a:avLst/>
+              </a:prstGeom>
+              <a:noFill/>
+              <a:ln>
+                <a:noFill/>
+              </a:ln>
+            </p:spPr>
+          </p:pic>
+          <p:sp>
+            <p:nvSpPr>
+              <p:cNvPr id="85" name="Shape 57"/>
+              <p:cNvSpPr txBox="1"/>
+              <p:nvPr/>
+            </p:nvSpPr>
+            <p:spPr>
+              <a:xfrm>
+                <a:off x="12750800" y="24455457"/>
+                <a:ext cx="6858000" cy="1498778"/>
+              </a:xfrm>
+              <a:prstGeom prst="rect">
+                <a:avLst/>
+              </a:prstGeom>
+              <a:noFill/>
+              <a:ln>
+                <a:noFill/>
+              </a:ln>
+            </p:spPr>
+            <p:txBody>
+              <a:bodyPr lIns="91425" tIns="91425" rIns="91425" bIns="91425" anchor="ctr" anchorCtr="0">
+                <a:noAutofit/>
+              </a:bodyPr>
+              <a:lstStyle/>
+              <a:p>
+                <a:pPr algn="ctr"/>
+                <a:r>
+                  <a:rPr lang="en-US" sz="12400" dirty="0" smtClean="0">
+                    <a:latin typeface="Overpass Bold"/>
+                    <a:ea typeface="Open Sans"/>
+                    <a:cs typeface="Overpass Bold"/>
+                    <a:sym typeface="Open Sans"/>
+                  </a:rPr>
+                  <a:t>P</a:t>
+                </a:r>
+                <a:r>
+                  <a:rPr lang="en" sz="12400" dirty="0" smtClean="0">
+                    <a:latin typeface="Overpass Bold"/>
+                    <a:ea typeface="Open Sans"/>
+                    <a:cs typeface="Overpass Bold"/>
+                    <a:sym typeface="Open Sans"/>
+                  </a:rPr>
+                  <a:t>opper</a:t>
+                </a:r>
+                <a:r>
+                  <a:rPr lang="en-US" sz="12400" dirty="0" smtClean="0">
+                    <a:latin typeface="Overpass Bold"/>
+                    <a:ea typeface="Open Sans"/>
+                    <a:cs typeface="Overpass Bold"/>
+                    <a:sym typeface="Open Sans"/>
+                  </a:rPr>
+                  <a:t>CI</a:t>
+                </a:r>
+                <a:endParaRPr lang="en" sz="12400" dirty="0">
+                  <a:latin typeface="Overpass Bold"/>
+                  <a:ea typeface="Open Sans"/>
+                  <a:cs typeface="Overpass Bold"/>
+                  <a:sym typeface="Open Sans"/>
+                </a:endParaRPr>
+              </a:p>
+            </p:txBody>
+          </p:sp>
+        </p:grpSp>
+        <p:cxnSp>
+          <p:nvCxnSpPr>
+            <p:cNvPr id="86" name="Shape 60"/>
+            <p:cNvCxnSpPr/>
+            <p:nvPr/>
+          </p:nvCxnSpPr>
+          <p:spPr>
+            <a:xfrm flipV="1">
+              <a:off x="9448800" y="3471086"/>
+              <a:ext cx="1981200" cy="532064"/>
+            </a:xfrm>
+            <a:prstGeom prst="straightConnector1">
+              <a:avLst/>
+            </a:prstGeom>
+            <a:noFill/>
+            <a:ln w="101600" cap="flat" cmpd="sng">
+              <a:solidFill>
+                <a:schemeClr val="tx1"/>
+              </a:solidFill>
+              <a:prstDash val="solid"/>
+              <a:round/>
+              <a:headEnd type="none" w="lg" len="lg"/>
+              <a:tailEnd type="triangle" w="lg" len="lg"/>
+            </a:ln>
+          </p:spPr>
+        </p:cxnSp>
+        <p:cxnSp>
+          <p:nvCxnSpPr>
+            <p:cNvPr id="87" name="Shape 60"/>
+            <p:cNvCxnSpPr/>
+            <p:nvPr/>
+          </p:nvCxnSpPr>
+          <p:spPr>
+            <a:xfrm flipV="1">
+              <a:off x="17186675" y="2644091"/>
+              <a:ext cx="4314933" cy="497010"/>
+            </a:xfrm>
+            <a:prstGeom prst="straightConnector1">
+              <a:avLst/>
+            </a:prstGeom>
+            <a:noFill/>
+            <a:ln w="101600" cap="flat" cmpd="sng">
+              <a:solidFill>
+                <a:schemeClr val="tx1"/>
+              </a:solidFill>
+              <a:prstDash val="solid"/>
+              <a:round/>
+              <a:headEnd type="none" w="lg" len="lg"/>
+              <a:tailEnd type="triangle" w="lg" len="lg"/>
+            </a:ln>
+          </p:spPr>
+        </p:cxnSp>
+        <p:cxnSp>
+          <p:nvCxnSpPr>
+            <p:cNvPr id="88" name="Shape 60"/>
+            <p:cNvCxnSpPr/>
+            <p:nvPr/>
+          </p:nvCxnSpPr>
+          <p:spPr>
+            <a:xfrm>
+              <a:off x="17647881" y="6008149"/>
+              <a:ext cx="3151682" cy="1281901"/>
+            </a:xfrm>
+            <a:prstGeom prst="straightConnector1">
+              <a:avLst/>
+            </a:prstGeom>
+            <a:noFill/>
+            <a:ln w="101600" cap="flat" cmpd="sng">
+              <a:solidFill>
+                <a:schemeClr val="tx1"/>
+              </a:solidFill>
+              <a:prstDash val="solid"/>
+              <a:round/>
+              <a:headEnd type="none" w="lg" len="lg"/>
+              <a:tailEnd type="triangle" w="lg" len="lg"/>
+            </a:ln>
+          </p:spPr>
+        </p:cxnSp>
         <p:pic>
           <p:nvPicPr>
-            <p:cNvPr id="62" name="Picture 61"/>
+            <p:cNvPr id="90" name="Picture 89"/>
             <p:cNvPicPr>
               <a:picLocks noChangeAspect="1"/>
             </p:cNvPicPr>
             <p:nvPr/>
           </p:nvPicPr>
           <p:blipFill>
-            <a:blip r:embed="rId3"/>
+            <a:blip r:embed="rId12"/>
             <a:stretch>
               <a:fillRect/>
             </a:stretch>
           </p:blipFill>
           <p:spPr>
             <a:xfrm>
-              <a:off x="8474027" y="5501928"/>
-              <a:ext cx="1948479" cy="2245322"/>
+              <a:off x="26728231" y="6883649"/>
+              <a:ext cx="3691020" cy="3279793"/>
             </a:xfrm>
             <a:prstGeom prst="rect">
               <a:avLst/>
@@ -6844,276 +7359,21 @@
         </p:pic>
         <p:pic>
           <p:nvPicPr>
-            <p:cNvPr id="63" name="Picture 62"/>
-            <p:cNvPicPr>
-              <a:picLocks noChangeAspect="1"/>
-            </p:cNvPicPr>
+            <p:cNvPr id="92" name="Shape 75"/>
+            <p:cNvPicPr preferRelativeResize="0"/>
             <p:nvPr/>
           </p:nvPicPr>
-          <p:blipFill>
-            <a:blip r:embed="rId4"/>
-            <a:stretch>
-              <a:fillRect/>
-            </a:stretch>
+          <p:blipFill rotWithShape="1">
+            <a:blip r:embed="rId13">
+              <a:alphaModFix/>
+            </a:blip>
+            <a:srcRect l="13043" t="4643" r="43112"/>
+            <a:stretch/>
           </p:blipFill>
           <p:spPr>
             <a:xfrm>
-              <a:off x="9383818" y="3449899"/>
-              <a:ext cx="2077375" cy="1919492"/>
-            </a:xfrm>
-            <a:prstGeom prst="rect">
-              <a:avLst/>
-            </a:prstGeom>
-          </p:spPr>
-        </p:pic>
-      </p:grpSp>
-      <p:pic>
-        <p:nvPicPr>
-          <p:cNvPr id="60" name="Picture 4" descr="Chameleon"/>
-          <p:cNvPicPr>
-            <a:picLocks noChangeAspect="1" noChangeArrowheads="1"/>
-          </p:cNvPicPr>
-          <p:nvPr/>
-        </p:nvPicPr>
-        <p:blipFill>
-          <a:blip r:embed="rId5">
-            <a:extLst>
-              <a:ext uri="{28A0092B-C50C-407E-A947-70E740481C1C}">
-                <a14:useLocalDpi xmlns:a14="http://schemas.microsoft.com/office/drawing/2010/main" val="0"/>
-              </a:ext>
-            </a:extLst>
-          </a:blip>
-          <a:srcRect/>
-          <a:stretch>
-            <a:fillRect/>
-          </a:stretch>
-        </p:blipFill>
-        <p:spPr bwMode="auto">
-          <a:xfrm>
-            <a:off x="21406355" y="595234"/>
-            <a:ext cx="5321876" cy="1524227"/>
-          </a:xfrm>
-          <a:prstGeom prst="rect">
-            <a:avLst/>
-          </a:prstGeom>
-          <a:noFill/>
-          <a:extLst>
-            <a:ext uri="{909E8E84-426E-40dd-AFC4-6F175D3DCCD1}">
-              <a14:hiddenFill xmlns:a14="http://schemas.microsoft.com/office/drawing/2010/main">
-                <a:solidFill>
-                  <a:srgbClr val="FFFFFF"/>
-                </a:solidFill>
-              </a14:hiddenFill>
-            </a:ext>
-          </a:extLst>
-        </p:spPr>
-      </p:pic>
-      <p:pic>
-        <p:nvPicPr>
-          <p:cNvPr id="61" name="Picture 2" descr="CloudLab"/>
-          <p:cNvPicPr>
-            <a:picLocks noChangeAspect="1" noChangeArrowheads="1"/>
-          </p:cNvPicPr>
-          <p:nvPr/>
-        </p:nvPicPr>
-        <p:blipFill>
-          <a:blip r:embed="rId6" cstate="print">
-            <a:extLst>
-              <a:ext uri="{28A0092B-C50C-407E-A947-70E740481C1C}">
-                <a14:useLocalDpi xmlns:a14="http://schemas.microsoft.com/office/drawing/2010/main" val="0"/>
-              </a:ext>
-            </a:extLst>
-          </a:blip>
-          <a:srcRect/>
-          <a:stretch>
-            <a:fillRect/>
-          </a:stretch>
-        </p:blipFill>
-        <p:spPr bwMode="auto">
-          <a:xfrm>
-            <a:off x="21406355" y="2545787"/>
-            <a:ext cx="5321879" cy="925298"/>
-          </a:xfrm>
-          <a:prstGeom prst="rect">
-            <a:avLst/>
-          </a:prstGeom>
-          <a:noFill/>
-          <a:extLst>
-            <a:ext uri="{909E8E84-426E-40dd-AFC4-6F175D3DCCD1}">
-              <a14:hiddenFill xmlns:a14="http://schemas.microsoft.com/office/drawing/2010/main">
-                <a:solidFill>
-                  <a:srgbClr val="FFFFFF"/>
-                </a:solidFill>
-              </a14:hiddenFill>
-            </a:ext>
-          </a:extLst>
-        </p:spPr>
-      </p:pic>
-      <p:pic>
-        <p:nvPicPr>
-          <p:cNvPr id="4" name="Picture 3"/>
-          <p:cNvPicPr>
-            <a:picLocks noChangeAspect="1"/>
-          </p:cNvPicPr>
-          <p:nvPr/>
-        </p:nvPicPr>
-        <p:blipFill>
-          <a:blip r:embed="rId7"/>
-          <a:stretch>
-            <a:fillRect/>
-          </a:stretch>
-        </p:blipFill>
-        <p:spPr>
-          <a:xfrm>
-            <a:off x="26728231" y="2458476"/>
-            <a:ext cx="3487820" cy="2615865"/>
-          </a:xfrm>
-          <a:prstGeom prst="rect">
-            <a:avLst/>
-          </a:prstGeom>
-        </p:spPr>
-      </p:pic>
-      <p:pic>
-        <p:nvPicPr>
-          <p:cNvPr id="5" name="Picture 4"/>
-          <p:cNvPicPr>
-            <a:picLocks noChangeAspect="1"/>
-          </p:cNvPicPr>
-          <p:nvPr/>
-        </p:nvPicPr>
-        <p:blipFill>
-          <a:blip r:embed="rId8"/>
-          <a:stretch>
-            <a:fillRect/>
-          </a:stretch>
-        </p:blipFill>
-        <p:spPr>
-          <a:xfrm>
-            <a:off x="26728234" y="1118473"/>
-            <a:ext cx="4057495" cy="1525618"/>
-          </a:xfrm>
-          <a:prstGeom prst="rect">
-            <a:avLst/>
-          </a:prstGeom>
-        </p:spPr>
-      </p:pic>
-      <p:pic>
-        <p:nvPicPr>
-          <p:cNvPr id="69" name="Shape 62"/>
-          <p:cNvPicPr preferRelativeResize="0"/>
-          <p:nvPr/>
-        </p:nvPicPr>
-        <p:blipFill>
-          <a:blip r:embed="rId9">
-            <a:alphaModFix/>
-            <a:duotone>
-              <a:prstClr val="black"/>
-              <a:prstClr val="white">
-                <a:tint val="45000"/>
-                <a:satMod val="400000"/>
-              </a:prstClr>
-            </a:duotone>
-          </a:blip>
-          <a:stretch>
-            <a:fillRect/>
-          </a:stretch>
-        </p:blipFill>
-        <p:spPr>
-          <a:xfrm>
-            <a:off x="-287325" y="5369391"/>
-            <a:ext cx="5384800" cy="4522358"/>
-          </a:xfrm>
-          <a:prstGeom prst="rect">
-            <a:avLst/>
-          </a:prstGeom>
-          <a:noFill/>
-          <a:ln>
-            <a:noFill/>
-          </a:ln>
-        </p:spPr>
-      </p:pic>
-      <p:cxnSp>
-        <p:nvCxnSpPr>
-          <p:cNvPr id="70" name="Shape 60"/>
-          <p:cNvCxnSpPr/>
-          <p:nvPr/>
-        </p:nvCxnSpPr>
-        <p:spPr>
-          <a:xfrm flipV="1">
-            <a:off x="3812331" y="5369391"/>
-            <a:ext cx="1928069" cy="1197346"/>
-          </a:xfrm>
-          <a:prstGeom prst="straightConnector1">
-            <a:avLst/>
-          </a:prstGeom>
-          <a:noFill/>
-          <a:ln w="101600" cap="flat" cmpd="sng">
-            <a:solidFill>
-              <a:schemeClr val="tx1"/>
-            </a:solidFill>
-            <a:prstDash val="solid"/>
-            <a:round/>
-            <a:headEnd type="none" w="lg" len="lg"/>
-            <a:tailEnd type="triangle" w="lg" len="lg"/>
-          </a:ln>
-        </p:spPr>
-      </p:cxnSp>
-      <p:grpSp>
-        <p:nvGrpSpPr>
-          <p:cNvPr id="9" name="Group 8"/>
-          <p:cNvGrpSpPr/>
-          <p:nvPr/>
-        </p:nvGrpSpPr>
-        <p:grpSpPr>
-          <a:xfrm>
-            <a:off x="10208108" y="1130732"/>
-            <a:ext cx="6858000" cy="4877417"/>
-            <a:chOff x="12750800" y="21076818"/>
-            <a:chExt cx="6858000" cy="4877417"/>
-          </a:xfrm>
-        </p:grpSpPr>
-        <p:pic>
-          <p:nvPicPr>
-            <p:cNvPr id="83" name="Picture 82"/>
-            <p:cNvPicPr>
-              <a:picLocks noChangeAspect="1"/>
-            </p:cNvPicPr>
-            <p:nvPr/>
-          </p:nvPicPr>
-          <p:blipFill>
-            <a:blip r:embed="rId10"/>
-            <a:stretch>
-              <a:fillRect/>
-            </a:stretch>
-          </p:blipFill>
-          <p:spPr>
-            <a:xfrm>
-              <a:off x="14354239" y="21076818"/>
-              <a:ext cx="3664563" cy="3667960"/>
-            </a:xfrm>
-            <a:prstGeom prst="rect">
-              <a:avLst/>
-            </a:prstGeom>
-          </p:spPr>
-        </p:pic>
-        <p:pic>
-          <p:nvPicPr>
-            <p:cNvPr id="84" name="Shape 56"/>
-            <p:cNvPicPr preferRelativeResize="0"/>
-            <p:nvPr/>
-          </p:nvPicPr>
-          <p:blipFill>
-            <a:blip r:embed="rId11">
-              <a:alphaModFix/>
-            </a:blip>
-            <a:stretch>
-              <a:fillRect/>
-            </a:stretch>
-          </p:blipFill>
-          <p:spPr>
-            <a:xfrm>
-              <a:off x="15221605" y="22418623"/>
-              <a:ext cx="1929828" cy="1911682"/>
+              <a:off x="22003394" y="6883649"/>
+              <a:ext cx="3531278" cy="3267439"/>
             </a:xfrm>
             <a:prstGeom prst="rect">
               <a:avLst/>
@@ -7124,905 +7384,711 @@
             </a:ln>
           </p:spPr>
         </p:pic>
-        <p:sp>
-          <p:nvSpPr>
-            <p:cNvPr id="85" name="Shape 57"/>
-            <p:cNvSpPr txBox="1"/>
+        <p:cxnSp>
+          <p:nvCxnSpPr>
+            <p:cNvPr id="95" name="Shape 60"/>
+            <p:cNvCxnSpPr/>
             <p:nvPr/>
-          </p:nvSpPr>
+          </p:nvCxnSpPr>
           <p:spPr>
-            <a:xfrm>
-              <a:off x="12750800" y="24455457"/>
-              <a:ext cx="6858000" cy="1498778"/>
+            <a:xfrm flipH="1">
+              <a:off x="17186675" y="9450385"/>
+              <a:ext cx="3612888" cy="700703"/>
             </a:xfrm>
-            <a:prstGeom prst="rect">
+            <a:prstGeom prst="straightConnector1">
               <a:avLst/>
             </a:prstGeom>
             <a:noFill/>
-            <a:ln>
-              <a:noFill/>
+            <a:ln w="101600" cap="flat" cmpd="sng">
+              <a:solidFill>
+                <a:schemeClr val="tx1"/>
+              </a:solidFill>
+              <a:prstDash val="solid"/>
+              <a:round/>
+              <a:headEnd type="none" w="lg" len="lg"/>
+              <a:tailEnd type="triangle" w="lg" len="lg"/>
             </a:ln>
           </p:spPr>
-          <p:txBody>
-            <a:bodyPr lIns="91425" tIns="91425" rIns="91425" bIns="91425" anchor="ctr" anchorCtr="0">
-              <a:noAutofit/>
-            </a:bodyPr>
-            <a:lstStyle/>
-            <a:p>
-              <a:pPr algn="ctr"/>
-              <a:r>
-                <a:rPr lang="en-US" sz="12400" dirty="0" smtClean="0">
-                  <a:latin typeface="Overpass Bold"/>
-                  <a:ea typeface="Open Sans"/>
-                  <a:cs typeface="Overpass Bold"/>
-                  <a:sym typeface="Open Sans"/>
-                </a:rPr>
-                <a:t>P</a:t>
-              </a:r>
-              <a:r>
-                <a:rPr lang="en" sz="12400" dirty="0" smtClean="0">
-                  <a:latin typeface="Overpass Bold"/>
-                  <a:ea typeface="Open Sans"/>
-                  <a:cs typeface="Overpass Bold"/>
-                  <a:sym typeface="Open Sans"/>
-                </a:rPr>
-                <a:t>opper</a:t>
-              </a:r>
-              <a:r>
-                <a:rPr lang="en-US" sz="12400" dirty="0" smtClean="0">
-                  <a:latin typeface="Overpass Bold"/>
-                  <a:ea typeface="Open Sans"/>
-                  <a:cs typeface="Overpass Bold"/>
-                  <a:sym typeface="Open Sans"/>
-                </a:rPr>
-                <a:t>CI</a:t>
-              </a:r>
-              <a:endParaRPr lang="en" sz="12400" dirty="0">
-                <a:latin typeface="Overpass Bold"/>
-                <a:ea typeface="Open Sans"/>
-                <a:cs typeface="Overpass Bold"/>
-                <a:sym typeface="Open Sans"/>
-              </a:endParaRPr>
-            </a:p>
-          </p:txBody>
-        </p:sp>
-      </p:grpSp>
-      <p:cxnSp>
-        <p:nvCxnSpPr>
-          <p:cNvPr id="86" name="Shape 60"/>
-          <p:cNvCxnSpPr/>
-          <p:nvPr/>
-        </p:nvCxnSpPr>
-        <p:spPr>
-          <a:xfrm flipV="1">
-            <a:off x="9448800" y="3471086"/>
-            <a:ext cx="1981200" cy="532064"/>
-          </a:xfrm>
-          <a:prstGeom prst="straightConnector1">
-            <a:avLst/>
-          </a:prstGeom>
-          <a:noFill/>
-          <a:ln w="101600" cap="flat" cmpd="sng">
-            <a:solidFill>
-              <a:schemeClr val="tx1"/>
-            </a:solidFill>
-            <a:prstDash val="solid"/>
-            <a:round/>
-            <a:headEnd type="none" w="lg" len="lg"/>
-            <a:tailEnd type="triangle" w="lg" len="lg"/>
-          </a:ln>
-        </p:spPr>
-      </p:cxnSp>
-      <p:cxnSp>
-        <p:nvCxnSpPr>
-          <p:cNvPr id="87" name="Shape 60"/>
-          <p:cNvCxnSpPr/>
-          <p:nvPr/>
-        </p:nvCxnSpPr>
-        <p:spPr>
-          <a:xfrm flipV="1">
-            <a:off x="17186675" y="2644091"/>
-            <a:ext cx="3612888" cy="497009"/>
-          </a:xfrm>
-          <a:prstGeom prst="straightConnector1">
-            <a:avLst/>
-          </a:prstGeom>
-          <a:noFill/>
-          <a:ln w="101600" cap="flat" cmpd="sng">
-            <a:solidFill>
-              <a:schemeClr val="tx1"/>
-            </a:solidFill>
-            <a:prstDash val="solid"/>
-            <a:round/>
-            <a:headEnd type="none" w="lg" len="lg"/>
-            <a:tailEnd type="triangle" w="lg" len="lg"/>
-          </a:ln>
-        </p:spPr>
-      </p:cxnSp>
-      <p:cxnSp>
-        <p:nvCxnSpPr>
-          <p:cNvPr id="88" name="Shape 60"/>
-          <p:cNvCxnSpPr/>
-          <p:nvPr/>
-        </p:nvCxnSpPr>
-        <p:spPr>
-          <a:xfrm>
-            <a:off x="17647881" y="6008149"/>
-            <a:ext cx="3151682" cy="1281901"/>
-          </a:xfrm>
-          <a:prstGeom prst="straightConnector1">
-            <a:avLst/>
-          </a:prstGeom>
-          <a:noFill/>
-          <a:ln w="101600" cap="flat" cmpd="sng">
-            <a:solidFill>
-              <a:schemeClr val="tx1"/>
-            </a:solidFill>
-            <a:prstDash val="solid"/>
-            <a:round/>
-            <a:headEnd type="none" w="lg" len="lg"/>
-            <a:tailEnd type="triangle" w="lg" len="lg"/>
-          </a:ln>
-        </p:spPr>
-      </p:cxnSp>
-      <p:pic>
-        <p:nvPicPr>
-          <p:cNvPr id="90" name="Picture 89"/>
-          <p:cNvPicPr>
-            <a:picLocks noChangeAspect="1"/>
-          </p:cNvPicPr>
-          <p:nvPr/>
-        </p:nvPicPr>
-        <p:blipFill>
-          <a:blip r:embed="rId12"/>
-          <a:stretch>
-            <a:fillRect/>
-          </a:stretch>
-        </p:blipFill>
-        <p:spPr>
-          <a:xfrm>
-            <a:off x="26728231" y="6883649"/>
-            <a:ext cx="3691020" cy="3279793"/>
-          </a:xfrm>
-          <a:prstGeom prst="rect">
-            <a:avLst/>
-          </a:prstGeom>
-        </p:spPr>
-      </p:pic>
-      <p:pic>
-        <p:nvPicPr>
-          <p:cNvPr id="92" name="Shape 75"/>
-          <p:cNvPicPr preferRelativeResize="0"/>
-          <p:nvPr/>
-        </p:nvPicPr>
-        <p:blipFill rotWithShape="1">
-          <a:blip r:embed="rId13">
-            <a:alphaModFix/>
-          </a:blip>
-          <a:srcRect l="13043" t="4643" r="43112"/>
-          <a:stretch/>
-        </p:blipFill>
-        <p:spPr>
-          <a:xfrm>
-            <a:off x="22003394" y="6883649"/>
-            <a:ext cx="3531278" cy="3267439"/>
-          </a:xfrm>
-          <a:prstGeom prst="rect">
-            <a:avLst/>
-          </a:prstGeom>
-          <a:noFill/>
-          <a:ln>
-            <a:noFill/>
-          </a:ln>
-        </p:spPr>
-      </p:pic>
-      <p:cxnSp>
-        <p:nvCxnSpPr>
-          <p:cNvPr id="95" name="Shape 60"/>
-          <p:cNvCxnSpPr/>
-          <p:nvPr/>
-        </p:nvCxnSpPr>
-        <p:spPr>
-          <a:xfrm flipH="1">
-            <a:off x="17186675" y="9450385"/>
-            <a:ext cx="3612888" cy="700703"/>
-          </a:xfrm>
-          <a:prstGeom prst="straightConnector1">
-            <a:avLst/>
-          </a:prstGeom>
-          <a:noFill/>
-          <a:ln w="101600" cap="flat" cmpd="sng">
-            <a:solidFill>
-              <a:schemeClr val="tx1"/>
-            </a:solidFill>
-            <a:prstDash val="solid"/>
-            <a:round/>
-            <a:headEnd type="none" w="lg" len="lg"/>
-            <a:tailEnd type="triangle" w="lg" len="lg"/>
-          </a:ln>
-        </p:spPr>
-      </p:cxnSp>
-      <p:grpSp>
-        <p:nvGrpSpPr>
-          <p:cNvPr id="132" name="Group 131"/>
-          <p:cNvGrpSpPr/>
-          <p:nvPr/>
-        </p:nvGrpSpPr>
-        <p:grpSpPr>
-          <a:xfrm>
-            <a:off x="11755098" y="8476297"/>
-            <a:ext cx="3541482" cy="3049732"/>
-            <a:chOff x="14391995" y="8145056"/>
-            <a:chExt cx="3541482" cy="3049732"/>
-          </a:xfrm>
-        </p:grpSpPr>
-        <p:pic>
-          <p:nvPicPr>
-            <p:cNvPr id="99" name="Shape 283" descr="Screen Shot 2016-11-08 at 11.42.44 AM.png"/>
-            <p:cNvPicPr preferRelativeResize="0"/>
+        </p:cxnSp>
+        <p:grpSp>
+          <p:nvGrpSpPr>
+            <p:cNvPr id="132" name="Group 131"/>
+            <p:cNvGrpSpPr/>
             <p:nvPr/>
-          </p:nvPicPr>
-          <p:blipFill rotWithShape="1">
-            <a:blip r:embed="rId14">
-              <a:alphaModFix/>
-            </a:blip>
-            <a:srcRect/>
-            <a:stretch/>
-          </p:blipFill>
+          </p:nvGrpSpPr>
+          <p:grpSpPr>
+            <a:xfrm>
+              <a:off x="11755098" y="8476297"/>
+              <a:ext cx="3541482" cy="3049732"/>
+              <a:chOff x="14391995" y="8145056"/>
+              <a:chExt cx="3541482" cy="3049732"/>
+            </a:xfrm>
+          </p:grpSpPr>
+          <p:pic>
+            <p:nvPicPr>
+              <p:cNvPr id="99" name="Shape 283" descr="Screen Shot 2016-11-08 at 11.42.44 AM.png"/>
+              <p:cNvPicPr preferRelativeResize="0"/>
+              <p:nvPr/>
+            </p:nvPicPr>
+            <p:blipFill rotWithShape="1">
+              <a:blip r:embed="rId14">
+                <a:alphaModFix/>
+              </a:blip>
+              <a:srcRect/>
+              <a:stretch/>
+            </p:blipFill>
+            <p:spPr>
+              <a:xfrm>
+                <a:off x="14432635" y="10028730"/>
+                <a:ext cx="3483833" cy="1166058"/>
+              </a:xfrm>
+              <a:prstGeom prst="rect">
+                <a:avLst/>
+              </a:prstGeom>
+              <a:noFill/>
+              <a:ln>
+                <a:noFill/>
+              </a:ln>
+            </p:spPr>
+          </p:pic>
+          <p:pic>
+            <p:nvPicPr>
+              <p:cNvPr id="100" name="Shape 282" descr="Screen Shot 2016-11-08 at 11.43.50 AM.png"/>
+              <p:cNvPicPr preferRelativeResize="0"/>
+              <p:nvPr/>
+            </p:nvPicPr>
+            <p:blipFill rotWithShape="1">
+              <a:blip r:embed="rId15">
+                <a:alphaModFix/>
+              </a:blip>
+              <a:srcRect/>
+              <a:stretch/>
+            </p:blipFill>
+            <p:spPr>
+              <a:xfrm>
+                <a:off x="14391995" y="9004359"/>
+                <a:ext cx="3541482" cy="1089627"/>
+              </a:xfrm>
+              <a:prstGeom prst="rect">
+                <a:avLst/>
+              </a:prstGeom>
+              <a:noFill/>
+              <a:ln>
+                <a:noFill/>
+              </a:ln>
+            </p:spPr>
+          </p:pic>
+          <p:pic>
+            <p:nvPicPr>
+              <p:cNvPr id="101" name="Shape 281" descr="Screen Shot 2016-11-08 at 11.39.10 AM.png"/>
+              <p:cNvPicPr preferRelativeResize="0"/>
+              <p:nvPr/>
+            </p:nvPicPr>
+            <p:blipFill rotWithShape="1">
+              <a:blip r:embed="rId16">
+                <a:alphaModFix/>
+              </a:blip>
+              <a:srcRect l="8214" t="79746" r="83591" b="16904"/>
+              <a:stretch/>
+            </p:blipFill>
+            <p:spPr>
+              <a:xfrm>
+                <a:off x="14575028" y="8145056"/>
+                <a:ext cx="3302000" cy="863600"/>
+              </a:xfrm>
+              <a:prstGeom prst="rect">
+                <a:avLst/>
+              </a:prstGeom>
+              <a:noFill/>
+              <a:ln>
+                <a:noFill/>
+              </a:ln>
+            </p:spPr>
+          </p:pic>
+        </p:grpSp>
+        <p:grpSp>
+          <p:nvGrpSpPr>
+            <p:cNvPr id="104" name="Group 103"/>
+            <p:cNvGrpSpPr/>
+            <p:nvPr/>
+          </p:nvGrpSpPr>
+          <p:grpSpPr>
+            <a:xfrm>
+              <a:off x="1649488" y="3673941"/>
+              <a:ext cx="3549587" cy="1846659"/>
+              <a:chOff x="3460813" y="3501977"/>
+              <a:chExt cx="3549587" cy="1846659"/>
+            </a:xfrm>
+          </p:grpSpPr>
+          <p:sp>
+            <p:nvSpPr>
+              <p:cNvPr id="102" name="Rectangle 101"/>
+              <p:cNvSpPr/>
+              <p:nvPr/>
+            </p:nvSpPr>
+            <p:spPr>
+              <a:xfrm>
+                <a:off x="3937842" y="3501977"/>
+                <a:ext cx="3072558" cy="1846659"/>
+              </a:xfrm>
+              <a:prstGeom prst="rect">
+                <a:avLst/>
+              </a:prstGeom>
+            </p:spPr>
+            <p:txBody>
+              <a:bodyPr wrap="square">
+                <a:spAutoFit/>
+              </a:bodyPr>
+              <a:lstStyle/>
+              <a:p>
+                <a:pPr algn="ctr"/>
+                <a:r>
+                  <a:rPr lang="en-US" sz="3800" dirty="0" smtClean="0">
+                    <a:solidFill>
+                      <a:prstClr val="black"/>
+                    </a:solidFill>
+                  </a:rPr>
+                  <a:t>Commit change to experiment</a:t>
+                </a:r>
+                <a:endParaRPr lang="en-US" sz="3800" dirty="0"/>
+              </a:p>
+            </p:txBody>
+          </p:sp>
+          <p:sp>
+            <p:nvSpPr>
+              <p:cNvPr id="103" name="Oval 102"/>
+              <p:cNvSpPr/>
+              <p:nvPr/>
+            </p:nvSpPr>
+            <p:spPr>
+              <a:xfrm>
+                <a:off x="3460813" y="4010833"/>
+                <a:ext cx="824423" cy="761143"/>
+              </a:xfrm>
+              <a:prstGeom prst="ellipse">
+                <a:avLst/>
+              </a:prstGeom>
+              <a:ln w="76200"/>
+            </p:spPr>
+            <p:style>
+              <a:lnRef idx="2">
+                <a:schemeClr val="dk1"/>
+              </a:lnRef>
+              <a:fillRef idx="1">
+                <a:schemeClr val="lt1"/>
+              </a:fillRef>
+              <a:effectRef idx="0">
+                <a:schemeClr val="dk1"/>
+              </a:effectRef>
+              <a:fontRef idx="minor">
+                <a:schemeClr val="dk1"/>
+              </a:fontRef>
+            </p:style>
+            <p:txBody>
+              <a:bodyPr rtlCol="0" anchor="ctr"/>
+              <a:lstStyle/>
+              <a:p>
+                <a:pPr algn="ctr"/>
+                <a:r>
+                  <a:rPr lang="en-US" sz="4800" b="1" dirty="0" smtClean="0"/>
+                  <a:t>1</a:t>
+                </a:r>
+                <a:endParaRPr lang="en-US" sz="4800" b="1" dirty="0"/>
+              </a:p>
+            </p:txBody>
+          </p:sp>
+        </p:grpSp>
+        <p:grpSp>
+          <p:nvGrpSpPr>
+            <p:cNvPr id="105" name="Group 104"/>
+            <p:cNvGrpSpPr/>
+            <p:nvPr/>
+          </p:nvGrpSpPr>
+          <p:grpSpPr>
+            <a:xfrm>
+              <a:off x="7948211" y="1695132"/>
+              <a:ext cx="3481789" cy="1270000"/>
+              <a:chOff x="3528611" y="3501977"/>
+              <a:chExt cx="3481789" cy="1270000"/>
+            </a:xfrm>
+          </p:grpSpPr>
+          <p:sp>
+            <p:nvSpPr>
+              <p:cNvPr id="106" name="Rectangle 105"/>
+              <p:cNvSpPr/>
+              <p:nvPr/>
+            </p:nvSpPr>
+            <p:spPr>
+              <a:xfrm>
+                <a:off x="3937842" y="3501977"/>
+                <a:ext cx="3072558" cy="1261884"/>
+              </a:xfrm>
+              <a:prstGeom prst="rect">
+                <a:avLst/>
+              </a:prstGeom>
+            </p:spPr>
+            <p:txBody>
+              <a:bodyPr wrap="square">
+                <a:spAutoFit/>
+              </a:bodyPr>
+              <a:lstStyle/>
+              <a:p>
+                <a:pPr algn="ctr"/>
+                <a:r>
+                  <a:rPr lang="en-US" sz="3800" dirty="0" smtClean="0">
+                    <a:solidFill>
+                      <a:prstClr val="black"/>
+                    </a:solidFill>
+                  </a:rPr>
+                  <a:t>Trigger execution</a:t>
+                </a:r>
+                <a:endParaRPr lang="en-US" sz="3800" dirty="0"/>
+              </a:p>
+            </p:txBody>
+          </p:sp>
+          <p:sp>
+            <p:nvSpPr>
+              <p:cNvPr id="107" name="Oval 106"/>
+              <p:cNvSpPr/>
+              <p:nvPr/>
+            </p:nvSpPr>
+            <p:spPr>
+              <a:xfrm>
+                <a:off x="3528611" y="3838245"/>
+                <a:ext cx="756625" cy="933732"/>
+              </a:xfrm>
+              <a:prstGeom prst="ellipse">
+                <a:avLst/>
+              </a:prstGeom>
+              <a:ln w="76200"/>
+            </p:spPr>
+            <p:style>
+              <a:lnRef idx="2">
+                <a:schemeClr val="dk1"/>
+              </a:lnRef>
+              <a:fillRef idx="1">
+                <a:schemeClr val="lt1"/>
+              </a:fillRef>
+              <a:effectRef idx="0">
+                <a:schemeClr val="dk1"/>
+              </a:effectRef>
+              <a:fontRef idx="minor">
+                <a:schemeClr val="dk1"/>
+              </a:fontRef>
+            </p:style>
+            <p:txBody>
+              <a:bodyPr rtlCol="0" anchor="ctr"/>
+              <a:lstStyle/>
+              <a:p>
+                <a:pPr algn="ctr"/>
+                <a:r>
+                  <a:rPr lang="en-US" sz="4800" b="1" dirty="0"/>
+                  <a:t>2</a:t>
+                </a:r>
+              </a:p>
+            </p:txBody>
+          </p:sp>
+        </p:grpSp>
+        <p:grpSp>
+          <p:nvGrpSpPr>
+            <p:cNvPr id="108" name="Group 107"/>
+            <p:cNvGrpSpPr/>
+            <p:nvPr/>
+          </p:nvGrpSpPr>
+          <p:grpSpPr>
+            <a:xfrm>
+              <a:off x="15596677" y="483473"/>
+              <a:ext cx="6000184" cy="1846659"/>
+              <a:chOff x="3434501" y="3501977"/>
+              <a:chExt cx="6000184" cy="1846659"/>
+            </a:xfrm>
+          </p:grpSpPr>
+          <p:sp>
+            <p:nvSpPr>
+              <p:cNvPr id="109" name="Rectangle 108"/>
+              <p:cNvSpPr/>
+              <p:nvPr/>
+            </p:nvSpPr>
+            <p:spPr>
+              <a:xfrm>
+                <a:off x="4128347" y="3501977"/>
+                <a:ext cx="5306338" cy="1846659"/>
+              </a:xfrm>
+              <a:prstGeom prst="rect">
+                <a:avLst/>
+              </a:prstGeom>
+            </p:spPr>
+            <p:txBody>
+              <a:bodyPr wrap="square">
+                <a:spAutoFit/>
+              </a:bodyPr>
+              <a:lstStyle/>
+              <a:p>
+                <a:pPr algn="ctr"/>
+                <a:r>
+                  <a:rPr lang="en-US" sz="3800" dirty="0" smtClean="0">
+                    <a:solidFill>
+                      <a:prstClr val="black"/>
+                    </a:solidFill>
+                  </a:rPr>
+                  <a:t>Run multi-node experiment on one of supported </a:t>
+                </a:r>
+                <a:r>
+                  <a:rPr lang="en-US" sz="3800" dirty="0" err="1" smtClean="0">
+                    <a:solidFill>
+                      <a:prstClr val="black"/>
+                    </a:solidFill>
+                  </a:rPr>
+                  <a:t>backends</a:t>
+                </a:r>
+                <a:endParaRPr lang="en-US" sz="3800" dirty="0"/>
+              </a:p>
+            </p:txBody>
+          </p:sp>
+          <p:sp>
+            <p:nvSpPr>
+              <p:cNvPr id="110" name="Oval 109"/>
+              <p:cNvSpPr/>
+              <p:nvPr/>
+            </p:nvSpPr>
+            <p:spPr>
+              <a:xfrm>
+                <a:off x="3434501" y="3869965"/>
+                <a:ext cx="850735" cy="902012"/>
+              </a:xfrm>
+              <a:prstGeom prst="ellipse">
+                <a:avLst/>
+              </a:prstGeom>
+              <a:ln w="76200"/>
+            </p:spPr>
+            <p:style>
+              <a:lnRef idx="2">
+                <a:schemeClr val="dk1"/>
+              </a:lnRef>
+              <a:fillRef idx="1">
+                <a:schemeClr val="lt1"/>
+              </a:fillRef>
+              <a:effectRef idx="0">
+                <a:schemeClr val="dk1"/>
+              </a:effectRef>
+              <a:fontRef idx="minor">
+                <a:schemeClr val="dk1"/>
+              </a:fontRef>
+            </p:style>
+            <p:txBody>
+              <a:bodyPr rtlCol="0" anchor="ctr"/>
+              <a:lstStyle/>
+              <a:p>
+                <a:pPr algn="ctr"/>
+                <a:r>
+                  <a:rPr lang="en-US" sz="4800" b="1" dirty="0"/>
+                  <a:t>3</a:t>
+                </a:r>
+              </a:p>
+            </p:txBody>
+          </p:sp>
+        </p:grpSp>
+        <p:grpSp>
+          <p:nvGrpSpPr>
+            <p:cNvPr id="111" name="Group 110"/>
+            <p:cNvGrpSpPr/>
+            <p:nvPr/>
+          </p:nvGrpSpPr>
+          <p:grpSpPr>
+            <a:xfrm>
+              <a:off x="25809224" y="4942515"/>
+              <a:ext cx="5989555" cy="1846659"/>
+              <a:chOff x="3445130" y="3501977"/>
+              <a:chExt cx="5989555" cy="1846659"/>
+            </a:xfrm>
+          </p:grpSpPr>
+          <p:sp>
+            <p:nvSpPr>
+              <p:cNvPr id="112" name="Rectangle 111"/>
+              <p:cNvSpPr/>
+              <p:nvPr/>
+            </p:nvSpPr>
+            <p:spPr>
+              <a:xfrm>
+                <a:off x="4128347" y="3501977"/>
+                <a:ext cx="5306338" cy="1846659"/>
+              </a:xfrm>
+              <a:prstGeom prst="rect">
+                <a:avLst/>
+              </a:prstGeom>
+            </p:spPr>
+            <p:txBody>
+              <a:bodyPr wrap="square">
+                <a:spAutoFit/>
+              </a:bodyPr>
+              <a:lstStyle/>
+              <a:p>
+                <a:pPr algn="ctr"/>
+                <a:r>
+                  <a:rPr lang="en-US" sz="3800" dirty="0" smtClean="0">
+                    <a:solidFill>
+                      <a:prstClr val="black"/>
+                    </a:solidFill>
+                  </a:rPr>
+                  <a:t>Experiment generates output datasets or runtime metrics</a:t>
+                </a:r>
+                <a:endParaRPr lang="en-US" sz="3800" dirty="0"/>
+              </a:p>
+            </p:txBody>
+          </p:sp>
+          <p:sp>
+            <p:nvSpPr>
+              <p:cNvPr id="113" name="Oval 112"/>
+              <p:cNvSpPr/>
+              <p:nvPr/>
+            </p:nvSpPr>
+            <p:spPr>
+              <a:xfrm>
+                <a:off x="3445130" y="3793413"/>
+                <a:ext cx="840106" cy="978563"/>
+              </a:xfrm>
+              <a:prstGeom prst="ellipse">
+                <a:avLst/>
+              </a:prstGeom>
+              <a:ln w="76200"/>
+            </p:spPr>
+            <p:style>
+              <a:lnRef idx="2">
+                <a:schemeClr val="dk1"/>
+              </a:lnRef>
+              <a:fillRef idx="1">
+                <a:schemeClr val="lt1"/>
+              </a:fillRef>
+              <a:effectRef idx="0">
+                <a:schemeClr val="dk1"/>
+              </a:effectRef>
+              <a:fontRef idx="minor">
+                <a:schemeClr val="dk1"/>
+              </a:fontRef>
+            </p:style>
+            <p:txBody>
+              <a:bodyPr rtlCol="0" anchor="ctr"/>
+              <a:lstStyle/>
+              <a:p>
+                <a:pPr algn="ctr"/>
+                <a:r>
+                  <a:rPr lang="en-US" sz="4800" b="1" dirty="0" smtClean="0"/>
+                  <a:t>4</a:t>
+                </a:r>
+                <a:endParaRPr lang="en-US" sz="4800" b="1" dirty="0"/>
+              </a:p>
+            </p:txBody>
+          </p:sp>
+        </p:grpSp>
+        <p:cxnSp>
+          <p:nvCxnSpPr>
+            <p:cNvPr id="115" name="Shape 60"/>
+            <p:cNvCxnSpPr/>
+            <p:nvPr/>
+          </p:nvCxnSpPr>
           <p:spPr>
             <a:xfrm>
-              <a:off x="14432635" y="10028730"/>
-              <a:ext cx="3483833" cy="1166058"/>
+              <a:off x="25303697" y="4996806"/>
+              <a:ext cx="0" cy="1569931"/>
             </a:xfrm>
-            <a:prstGeom prst="rect">
+            <a:prstGeom prst="straightConnector1">
               <a:avLst/>
             </a:prstGeom>
             <a:noFill/>
-            <a:ln>
-              <a:noFill/>
+            <a:ln w="101600" cap="flat" cmpd="sng">
+              <a:solidFill>
+                <a:schemeClr val="tx1"/>
+              </a:solidFill>
+              <a:prstDash val="solid"/>
+              <a:round/>
+              <a:headEnd type="none" w="lg" len="lg"/>
+              <a:tailEnd type="triangle" w="lg" len="lg"/>
             </a:ln>
           </p:spPr>
-        </p:pic>
-        <p:pic>
-          <p:nvPicPr>
-            <p:cNvPr id="100" name="Shape 282" descr="Screen Shot 2016-11-08 at 11.43.50 AM.png"/>
-            <p:cNvPicPr preferRelativeResize="0"/>
+        </p:cxnSp>
+        <p:grpSp>
+          <p:nvGrpSpPr>
+            <p:cNvPr id="119" name="Group 118"/>
+            <p:cNvGrpSpPr/>
             <p:nvPr/>
-          </p:nvPicPr>
-          <p:blipFill rotWithShape="1">
-            <a:blip r:embed="rId15">
-              <a:alphaModFix/>
-            </a:blip>
-            <a:srcRect/>
-            <a:stretch/>
-          </p:blipFill>
-          <p:spPr>
+          </p:nvGrpSpPr>
+          <p:grpSpPr>
             <a:xfrm>
-              <a:off x="14391995" y="9004359"/>
-              <a:ext cx="3541482" cy="1089627"/>
+              <a:off x="17264148" y="4171585"/>
+              <a:ext cx="5989555" cy="2431435"/>
+              <a:chOff x="3445130" y="3501977"/>
+              <a:chExt cx="5989555" cy="2431435"/>
             </a:xfrm>
-            <a:prstGeom prst="rect">
-              <a:avLst/>
-            </a:prstGeom>
-            <a:noFill/>
-            <a:ln>
-              <a:noFill/>
-            </a:ln>
-          </p:spPr>
-        </p:pic>
-        <p:pic>
-          <p:nvPicPr>
-            <p:cNvPr id="101" name="Shape 281" descr="Screen Shot 2016-11-08 at 11.39.10 AM.png"/>
-            <p:cNvPicPr preferRelativeResize="0"/>
+          </p:grpSpPr>
+          <p:sp>
+            <p:nvSpPr>
+              <p:cNvPr id="120" name="Rectangle 119"/>
+              <p:cNvSpPr/>
+              <p:nvPr/>
+            </p:nvSpPr>
+            <p:spPr>
+              <a:xfrm>
+                <a:off x="4128347" y="3501977"/>
+                <a:ext cx="5306338" cy="2431435"/>
+              </a:xfrm>
+              <a:prstGeom prst="rect">
+                <a:avLst/>
+              </a:prstGeom>
+            </p:spPr>
+            <p:txBody>
+              <a:bodyPr wrap="square">
+                <a:spAutoFit/>
+              </a:bodyPr>
+              <a:lstStyle/>
+              <a:p>
+                <a:pPr algn="ctr"/>
+                <a:r>
+                  <a:rPr lang="en-US" sz="3800" dirty="0" smtClean="0">
+                    <a:solidFill>
+                      <a:prstClr val="black"/>
+                    </a:solidFill>
+                  </a:rPr>
+                  <a:t>Validate experiment results by testing codified assertions on output</a:t>
+                </a:r>
+                <a:endParaRPr lang="en-US" sz="3800" dirty="0"/>
+              </a:p>
+            </p:txBody>
+          </p:sp>
+          <p:sp>
+            <p:nvSpPr>
+              <p:cNvPr id="121" name="Oval 120"/>
+              <p:cNvSpPr/>
+              <p:nvPr/>
+            </p:nvSpPr>
+            <p:spPr>
+              <a:xfrm>
+                <a:off x="3445130" y="3793413"/>
+                <a:ext cx="840106" cy="978563"/>
+              </a:xfrm>
+              <a:prstGeom prst="ellipse">
+                <a:avLst/>
+              </a:prstGeom>
+              <a:ln w="76200"/>
+            </p:spPr>
+            <p:style>
+              <a:lnRef idx="2">
+                <a:schemeClr val="dk1"/>
+              </a:lnRef>
+              <a:fillRef idx="1">
+                <a:schemeClr val="lt1"/>
+              </a:fillRef>
+              <a:effectRef idx="0">
+                <a:schemeClr val="dk1"/>
+              </a:effectRef>
+              <a:fontRef idx="minor">
+                <a:schemeClr val="dk1"/>
+              </a:fontRef>
+            </p:style>
+            <p:txBody>
+              <a:bodyPr rtlCol="0" anchor="ctr"/>
+              <a:lstStyle/>
+              <a:p>
+                <a:pPr algn="ctr"/>
+                <a:r>
+                  <a:rPr lang="en-US" sz="4800" b="1" dirty="0"/>
+                  <a:t>5</a:t>
+                </a:r>
+              </a:p>
+            </p:txBody>
+          </p:sp>
+        </p:grpSp>
+        <p:grpSp>
+          <p:nvGrpSpPr>
+            <p:cNvPr id="123" name="Group 122"/>
+            <p:cNvGrpSpPr/>
             <p:nvPr/>
-          </p:nvPicPr>
-          <p:blipFill rotWithShape="1">
-            <a:blip r:embed="rId16">
-              <a:alphaModFix/>
-            </a:blip>
-            <a:srcRect l="8214" t="79746" r="83591" b="16904"/>
-            <a:stretch/>
-          </p:blipFill>
-          <p:spPr>
+          </p:nvGrpSpPr>
+          <p:grpSpPr>
             <a:xfrm>
-              <a:off x="14575028" y="8145056"/>
-              <a:ext cx="3302000" cy="863600"/>
+              <a:off x="15416800" y="7206298"/>
+              <a:ext cx="6084808" cy="2431435"/>
+              <a:chOff x="3445130" y="3501977"/>
+              <a:chExt cx="6084808" cy="2431435"/>
             </a:xfrm>
-            <a:prstGeom prst="rect">
-              <a:avLst/>
-            </a:prstGeom>
-            <a:noFill/>
-            <a:ln>
-              <a:noFill/>
-            </a:ln>
-          </p:spPr>
-        </p:pic>
-      </p:grpSp>
-      <p:grpSp>
-        <p:nvGrpSpPr>
-          <p:cNvPr id="104" name="Group 103"/>
-          <p:cNvGrpSpPr/>
-          <p:nvPr/>
-        </p:nvGrpSpPr>
-        <p:grpSpPr>
-          <a:xfrm>
-            <a:off x="1649488" y="3673941"/>
-            <a:ext cx="3549587" cy="1846659"/>
-            <a:chOff x="3460813" y="3501977"/>
-            <a:chExt cx="3549587" cy="1846659"/>
-          </a:xfrm>
-        </p:grpSpPr>
-        <p:sp>
-          <p:nvSpPr>
-            <p:cNvPr id="102" name="Rectangle 101"/>
-            <p:cNvSpPr/>
-            <p:nvPr/>
-          </p:nvSpPr>
-          <p:spPr>
-            <a:xfrm>
-              <a:off x="3937842" y="3501977"/>
-              <a:ext cx="3072558" cy="1846659"/>
-            </a:xfrm>
-            <a:prstGeom prst="rect">
-              <a:avLst/>
-            </a:prstGeom>
-          </p:spPr>
-          <p:txBody>
-            <a:bodyPr wrap="square">
-              <a:spAutoFit/>
-            </a:bodyPr>
-            <a:lstStyle/>
-            <a:p>
-              <a:pPr algn="ctr"/>
-              <a:r>
-                <a:rPr lang="en-US" sz="3800" dirty="0" smtClean="0">
-                  <a:solidFill>
-                    <a:prstClr val="black"/>
-                  </a:solidFill>
-                </a:rPr>
-                <a:t>Commit change to experiment</a:t>
-              </a:r>
-              <a:endParaRPr lang="en-US" sz="3800" dirty="0"/>
-            </a:p>
-          </p:txBody>
-        </p:sp>
-        <p:sp>
-          <p:nvSpPr>
-            <p:cNvPr id="103" name="Oval 102"/>
-            <p:cNvSpPr/>
-            <p:nvPr/>
-          </p:nvSpPr>
-          <p:spPr>
-            <a:xfrm>
-              <a:off x="3460813" y="4010833"/>
-              <a:ext cx="824423" cy="761143"/>
-            </a:xfrm>
-            <a:prstGeom prst="ellipse">
-              <a:avLst/>
-            </a:prstGeom>
-            <a:ln w="76200"/>
-          </p:spPr>
-          <p:style>
-            <a:lnRef idx="2">
-              <a:schemeClr val="dk1"/>
-            </a:lnRef>
-            <a:fillRef idx="1">
-              <a:schemeClr val="lt1"/>
-            </a:fillRef>
-            <a:effectRef idx="0">
-              <a:schemeClr val="dk1"/>
-            </a:effectRef>
-            <a:fontRef idx="minor">
-              <a:schemeClr val="dk1"/>
-            </a:fontRef>
-          </p:style>
-          <p:txBody>
-            <a:bodyPr rtlCol="0" anchor="ctr"/>
-            <a:lstStyle/>
-            <a:p>
-              <a:pPr algn="ctr"/>
-              <a:r>
-                <a:rPr lang="en-US" sz="4800" b="1" dirty="0" smtClean="0"/>
-                <a:t>1</a:t>
-              </a:r>
-              <a:endParaRPr lang="en-US" sz="4800" b="1" dirty="0"/>
-            </a:p>
-          </p:txBody>
-        </p:sp>
-      </p:grpSp>
-      <p:grpSp>
-        <p:nvGrpSpPr>
-          <p:cNvPr id="105" name="Group 104"/>
-          <p:cNvGrpSpPr/>
-          <p:nvPr/>
-        </p:nvGrpSpPr>
-        <p:grpSpPr>
-          <a:xfrm>
-            <a:off x="7948211" y="1695132"/>
-            <a:ext cx="3481789" cy="1270000"/>
-            <a:chOff x="3528611" y="3501977"/>
-            <a:chExt cx="3481789" cy="1270000"/>
-          </a:xfrm>
-        </p:grpSpPr>
-        <p:sp>
-          <p:nvSpPr>
-            <p:cNvPr id="106" name="Rectangle 105"/>
-            <p:cNvSpPr/>
-            <p:nvPr/>
-          </p:nvSpPr>
-          <p:spPr>
-            <a:xfrm>
-              <a:off x="3937842" y="3501977"/>
-              <a:ext cx="3072558" cy="1261884"/>
-            </a:xfrm>
-            <a:prstGeom prst="rect">
-              <a:avLst/>
-            </a:prstGeom>
-          </p:spPr>
-          <p:txBody>
-            <a:bodyPr wrap="square">
-              <a:spAutoFit/>
-            </a:bodyPr>
-            <a:lstStyle/>
-            <a:p>
-              <a:pPr algn="ctr"/>
-              <a:r>
-                <a:rPr lang="en-US" sz="3800" dirty="0" smtClean="0">
-                  <a:solidFill>
-                    <a:prstClr val="black"/>
-                  </a:solidFill>
-                </a:rPr>
-                <a:t>Trigger execution</a:t>
-              </a:r>
-              <a:endParaRPr lang="en-US" sz="3800" dirty="0"/>
-            </a:p>
-          </p:txBody>
-        </p:sp>
-        <p:sp>
-          <p:nvSpPr>
-            <p:cNvPr id="107" name="Oval 106"/>
-            <p:cNvSpPr/>
-            <p:nvPr/>
-          </p:nvSpPr>
-          <p:spPr>
-            <a:xfrm>
-              <a:off x="3528611" y="3838245"/>
-              <a:ext cx="756625" cy="933732"/>
-            </a:xfrm>
-            <a:prstGeom prst="ellipse">
-              <a:avLst/>
-            </a:prstGeom>
-            <a:ln w="76200"/>
-          </p:spPr>
-          <p:style>
-            <a:lnRef idx="2">
-              <a:schemeClr val="dk1"/>
-            </a:lnRef>
-            <a:fillRef idx="1">
-              <a:schemeClr val="lt1"/>
-            </a:fillRef>
-            <a:effectRef idx="0">
-              <a:schemeClr val="dk1"/>
-            </a:effectRef>
-            <a:fontRef idx="minor">
-              <a:schemeClr val="dk1"/>
-            </a:fontRef>
-          </p:style>
-          <p:txBody>
-            <a:bodyPr rtlCol="0" anchor="ctr"/>
-            <a:lstStyle/>
-            <a:p>
-              <a:pPr algn="ctr"/>
-              <a:r>
-                <a:rPr lang="en-US" sz="4800" b="1" dirty="0"/>
-                <a:t>2</a:t>
-              </a:r>
-              <a:endParaRPr lang="en-US" sz="4800" b="1" dirty="0"/>
-            </a:p>
-          </p:txBody>
-        </p:sp>
-      </p:grpSp>
-      <p:grpSp>
-        <p:nvGrpSpPr>
-          <p:cNvPr id="108" name="Group 107"/>
-          <p:cNvGrpSpPr/>
-          <p:nvPr/>
-        </p:nvGrpSpPr>
-        <p:grpSpPr>
-          <a:xfrm>
-            <a:off x="15596677" y="483473"/>
-            <a:ext cx="6000184" cy="1846659"/>
-            <a:chOff x="3434501" y="3501977"/>
-            <a:chExt cx="6000184" cy="1846659"/>
-          </a:xfrm>
-        </p:grpSpPr>
-        <p:sp>
-          <p:nvSpPr>
-            <p:cNvPr id="109" name="Rectangle 108"/>
-            <p:cNvSpPr/>
-            <p:nvPr/>
-          </p:nvSpPr>
-          <p:spPr>
-            <a:xfrm>
-              <a:off x="4128347" y="3501977"/>
-              <a:ext cx="5306338" cy="1846659"/>
-            </a:xfrm>
-            <a:prstGeom prst="rect">
-              <a:avLst/>
-            </a:prstGeom>
-          </p:spPr>
-          <p:txBody>
-            <a:bodyPr wrap="square">
-              <a:spAutoFit/>
-            </a:bodyPr>
-            <a:lstStyle/>
-            <a:p>
-              <a:pPr algn="ctr"/>
-              <a:r>
-                <a:rPr lang="en-US" sz="3800" dirty="0" smtClean="0">
-                  <a:solidFill>
-                    <a:prstClr val="black"/>
-                  </a:solidFill>
-                </a:rPr>
-                <a:t>Run multi-node experiment on one of supported </a:t>
-              </a:r>
-              <a:r>
-                <a:rPr lang="en-US" sz="3800" dirty="0" err="1" smtClean="0">
-                  <a:solidFill>
-                    <a:prstClr val="black"/>
-                  </a:solidFill>
-                </a:rPr>
-                <a:t>backends</a:t>
-              </a:r>
-              <a:endParaRPr lang="en-US" sz="3800" dirty="0"/>
-            </a:p>
-          </p:txBody>
-        </p:sp>
-        <p:sp>
-          <p:nvSpPr>
-            <p:cNvPr id="110" name="Oval 109"/>
-            <p:cNvSpPr/>
-            <p:nvPr/>
-          </p:nvSpPr>
-          <p:spPr>
-            <a:xfrm>
-              <a:off x="3434501" y="3869965"/>
-              <a:ext cx="850735" cy="902012"/>
-            </a:xfrm>
-            <a:prstGeom prst="ellipse">
-              <a:avLst/>
-            </a:prstGeom>
-            <a:ln w="76200"/>
-          </p:spPr>
-          <p:style>
-            <a:lnRef idx="2">
-              <a:schemeClr val="dk1"/>
-            </a:lnRef>
-            <a:fillRef idx="1">
-              <a:schemeClr val="lt1"/>
-            </a:fillRef>
-            <a:effectRef idx="0">
-              <a:schemeClr val="dk1"/>
-            </a:effectRef>
-            <a:fontRef idx="minor">
-              <a:schemeClr val="dk1"/>
-            </a:fontRef>
-          </p:style>
-          <p:txBody>
-            <a:bodyPr rtlCol="0" anchor="ctr"/>
-            <a:lstStyle/>
-            <a:p>
-              <a:pPr algn="ctr"/>
-              <a:r>
-                <a:rPr lang="en-US" sz="4800" b="1" dirty="0"/>
-                <a:t>3</a:t>
-              </a:r>
-              <a:endParaRPr lang="en-US" sz="4800" b="1" dirty="0"/>
-            </a:p>
-          </p:txBody>
-        </p:sp>
-      </p:grpSp>
-      <p:grpSp>
-        <p:nvGrpSpPr>
-          <p:cNvPr id="111" name="Group 110"/>
-          <p:cNvGrpSpPr/>
-          <p:nvPr/>
-        </p:nvGrpSpPr>
-        <p:grpSpPr>
-          <a:xfrm>
-            <a:off x="25809224" y="4942515"/>
-            <a:ext cx="5989555" cy="1846659"/>
-            <a:chOff x="3445130" y="3501977"/>
-            <a:chExt cx="5989555" cy="1846659"/>
-          </a:xfrm>
-        </p:grpSpPr>
-        <p:sp>
-          <p:nvSpPr>
-            <p:cNvPr id="112" name="Rectangle 111"/>
-            <p:cNvSpPr/>
-            <p:nvPr/>
-          </p:nvSpPr>
-          <p:spPr>
-            <a:xfrm>
-              <a:off x="4128347" y="3501977"/>
-              <a:ext cx="5306338" cy="1846659"/>
-            </a:xfrm>
-            <a:prstGeom prst="rect">
-              <a:avLst/>
-            </a:prstGeom>
-          </p:spPr>
-          <p:txBody>
-            <a:bodyPr wrap="square">
-              <a:spAutoFit/>
-            </a:bodyPr>
-            <a:lstStyle/>
-            <a:p>
-              <a:pPr algn="ctr"/>
-              <a:r>
-                <a:rPr lang="en-US" sz="3800" dirty="0" smtClean="0">
-                  <a:solidFill>
-                    <a:prstClr val="black"/>
-                  </a:solidFill>
-                </a:rPr>
-                <a:t>Experiment generates output datasets or runtime metrics</a:t>
-              </a:r>
-              <a:endParaRPr lang="en-US" sz="3800" dirty="0"/>
-            </a:p>
-          </p:txBody>
-        </p:sp>
-        <p:sp>
-          <p:nvSpPr>
-            <p:cNvPr id="113" name="Oval 112"/>
-            <p:cNvSpPr/>
-            <p:nvPr/>
-          </p:nvSpPr>
-          <p:spPr>
-            <a:xfrm>
-              <a:off x="3445130" y="3793413"/>
-              <a:ext cx="840106" cy="978563"/>
-            </a:xfrm>
-            <a:prstGeom prst="ellipse">
-              <a:avLst/>
-            </a:prstGeom>
-            <a:ln w="76200"/>
-          </p:spPr>
-          <p:style>
-            <a:lnRef idx="2">
-              <a:schemeClr val="dk1"/>
-            </a:lnRef>
-            <a:fillRef idx="1">
-              <a:schemeClr val="lt1"/>
-            </a:fillRef>
-            <a:effectRef idx="0">
-              <a:schemeClr val="dk1"/>
-            </a:effectRef>
-            <a:fontRef idx="minor">
-              <a:schemeClr val="dk1"/>
-            </a:fontRef>
-          </p:style>
-          <p:txBody>
-            <a:bodyPr rtlCol="0" anchor="ctr"/>
-            <a:lstStyle/>
-            <a:p>
-              <a:pPr algn="ctr"/>
-              <a:r>
-                <a:rPr lang="en-US" sz="4800" b="1" dirty="0" smtClean="0"/>
-                <a:t>4</a:t>
-              </a:r>
-              <a:endParaRPr lang="en-US" sz="4800" b="1" dirty="0"/>
-            </a:p>
-          </p:txBody>
-        </p:sp>
-      </p:grpSp>
-      <p:cxnSp>
-        <p:nvCxnSpPr>
-          <p:cNvPr id="115" name="Shape 60"/>
-          <p:cNvCxnSpPr/>
-          <p:nvPr/>
-        </p:nvCxnSpPr>
-        <p:spPr>
-          <a:xfrm>
-            <a:off x="25303697" y="4996806"/>
-            <a:ext cx="0" cy="1569931"/>
-          </a:xfrm>
-          <a:prstGeom prst="straightConnector1">
-            <a:avLst/>
-          </a:prstGeom>
-          <a:noFill/>
-          <a:ln w="101600" cap="flat" cmpd="sng">
-            <a:solidFill>
-              <a:schemeClr val="tx1"/>
-            </a:solidFill>
-            <a:prstDash val="solid"/>
-            <a:round/>
-            <a:headEnd type="none" w="lg" len="lg"/>
-            <a:tailEnd type="triangle" w="lg" len="lg"/>
-          </a:ln>
-        </p:spPr>
-      </p:cxnSp>
-      <p:grpSp>
-        <p:nvGrpSpPr>
-          <p:cNvPr id="119" name="Group 118"/>
-          <p:cNvGrpSpPr/>
-          <p:nvPr/>
-        </p:nvGrpSpPr>
-        <p:grpSpPr>
-          <a:xfrm>
-            <a:off x="17264148" y="4171585"/>
-            <a:ext cx="5989555" cy="2431435"/>
-            <a:chOff x="3445130" y="3501977"/>
-            <a:chExt cx="5989555" cy="2431435"/>
-          </a:xfrm>
-        </p:grpSpPr>
-        <p:sp>
-          <p:nvSpPr>
-            <p:cNvPr id="120" name="Rectangle 119"/>
-            <p:cNvSpPr/>
-            <p:nvPr/>
-          </p:nvSpPr>
-          <p:spPr>
-            <a:xfrm>
-              <a:off x="4128347" y="3501977"/>
-              <a:ext cx="5306338" cy="2431435"/>
-            </a:xfrm>
-            <a:prstGeom prst="rect">
-              <a:avLst/>
-            </a:prstGeom>
-          </p:spPr>
-          <p:txBody>
-            <a:bodyPr wrap="square">
-              <a:spAutoFit/>
-            </a:bodyPr>
-            <a:lstStyle/>
-            <a:p>
-              <a:pPr algn="ctr"/>
-              <a:r>
-                <a:rPr lang="en-US" sz="3800" dirty="0" smtClean="0">
-                  <a:solidFill>
-                    <a:prstClr val="black"/>
-                  </a:solidFill>
-                </a:rPr>
-                <a:t>Validate experiment results by testing codified assertions on output</a:t>
-              </a:r>
-              <a:endParaRPr lang="en-US" sz="3800" dirty="0"/>
-            </a:p>
-          </p:txBody>
-        </p:sp>
-        <p:sp>
-          <p:nvSpPr>
-            <p:cNvPr id="121" name="Oval 120"/>
-            <p:cNvSpPr/>
-            <p:nvPr/>
-          </p:nvSpPr>
-          <p:spPr>
-            <a:xfrm>
-              <a:off x="3445130" y="3793413"/>
-              <a:ext cx="840106" cy="978563"/>
-            </a:xfrm>
-            <a:prstGeom prst="ellipse">
-              <a:avLst/>
-            </a:prstGeom>
-            <a:ln w="76200"/>
-          </p:spPr>
-          <p:style>
-            <a:lnRef idx="2">
-              <a:schemeClr val="dk1"/>
-            </a:lnRef>
-            <a:fillRef idx="1">
-              <a:schemeClr val="lt1"/>
-            </a:fillRef>
-            <a:effectRef idx="0">
-              <a:schemeClr val="dk1"/>
-            </a:effectRef>
-            <a:fontRef idx="minor">
-              <a:schemeClr val="dk1"/>
-            </a:fontRef>
-          </p:style>
-          <p:txBody>
-            <a:bodyPr rtlCol="0" anchor="ctr"/>
-            <a:lstStyle/>
-            <a:p>
-              <a:pPr algn="ctr"/>
-              <a:r>
-                <a:rPr lang="en-US" sz="4800" b="1" dirty="0"/>
-                <a:t>5</a:t>
-              </a:r>
-              <a:endParaRPr lang="en-US" sz="4800" b="1" dirty="0"/>
-            </a:p>
-          </p:txBody>
-        </p:sp>
-      </p:grpSp>
-      <p:grpSp>
-        <p:nvGrpSpPr>
-          <p:cNvPr id="123" name="Group 122"/>
-          <p:cNvGrpSpPr/>
-          <p:nvPr/>
-        </p:nvGrpSpPr>
-        <p:grpSpPr>
-          <a:xfrm>
-            <a:off x="15416800" y="7206298"/>
-            <a:ext cx="6084808" cy="2431435"/>
-            <a:chOff x="3445130" y="3501977"/>
-            <a:chExt cx="6084808" cy="2431435"/>
-          </a:xfrm>
-        </p:grpSpPr>
-        <p:sp>
-          <p:nvSpPr>
-            <p:cNvPr id="124" name="Rectangle 123"/>
-            <p:cNvSpPr/>
-            <p:nvPr/>
-          </p:nvSpPr>
-          <p:spPr>
-            <a:xfrm>
-              <a:off x="4223600" y="3501977"/>
-              <a:ext cx="5306338" cy="2431435"/>
-            </a:xfrm>
-            <a:prstGeom prst="rect">
-              <a:avLst/>
-            </a:prstGeom>
-          </p:spPr>
-          <p:txBody>
-            <a:bodyPr wrap="square">
-              <a:spAutoFit/>
-            </a:bodyPr>
-            <a:lstStyle/>
-            <a:p>
-              <a:pPr algn="ctr"/>
-              <a:r>
-                <a:rPr lang="en-US" sz="3800" dirty="0" smtClean="0">
-                  <a:solidFill>
-                    <a:prstClr val="black"/>
-                  </a:solidFill>
-                </a:rPr>
-                <a:t>Keep track of execution and associated status to the corresponding commit</a:t>
-              </a:r>
-              <a:endParaRPr lang="en-US" sz="3800" dirty="0"/>
-            </a:p>
-          </p:txBody>
-        </p:sp>
-        <p:sp>
-          <p:nvSpPr>
-            <p:cNvPr id="125" name="Oval 124"/>
-            <p:cNvSpPr/>
-            <p:nvPr/>
-          </p:nvSpPr>
-          <p:spPr>
-            <a:xfrm>
-              <a:off x="3445130" y="3793413"/>
-              <a:ext cx="840106" cy="978563"/>
-            </a:xfrm>
-            <a:prstGeom prst="ellipse">
-              <a:avLst/>
-            </a:prstGeom>
-            <a:ln w="76200"/>
-          </p:spPr>
-          <p:style>
-            <a:lnRef idx="2">
-              <a:schemeClr val="dk1"/>
-            </a:lnRef>
-            <a:fillRef idx="1">
-              <a:schemeClr val="lt1"/>
-            </a:fillRef>
-            <a:effectRef idx="0">
-              <a:schemeClr val="dk1"/>
-            </a:effectRef>
-            <a:fontRef idx="minor">
-              <a:schemeClr val="dk1"/>
-            </a:fontRef>
-          </p:style>
-          <p:txBody>
-            <a:bodyPr rtlCol="0" anchor="ctr"/>
-            <a:lstStyle/>
-            <a:p>
-              <a:pPr algn="ctr"/>
-              <a:r>
-                <a:rPr lang="en-US" sz="4800" b="1" dirty="0" smtClean="0"/>
-                <a:t>6</a:t>
-              </a:r>
-              <a:endParaRPr lang="en-US" sz="4800" b="1" dirty="0"/>
-            </a:p>
-          </p:txBody>
-        </p:sp>
+          </p:grpSpPr>
+          <p:sp>
+            <p:nvSpPr>
+              <p:cNvPr id="124" name="Rectangle 123"/>
+              <p:cNvSpPr/>
+              <p:nvPr/>
+            </p:nvSpPr>
+            <p:spPr>
+              <a:xfrm>
+                <a:off x="4223600" y="3501977"/>
+                <a:ext cx="5306338" cy="2431435"/>
+              </a:xfrm>
+              <a:prstGeom prst="rect">
+                <a:avLst/>
+              </a:prstGeom>
+            </p:spPr>
+            <p:txBody>
+              <a:bodyPr wrap="square">
+                <a:spAutoFit/>
+              </a:bodyPr>
+              <a:lstStyle/>
+              <a:p>
+                <a:pPr algn="ctr"/>
+                <a:r>
+                  <a:rPr lang="en-US" sz="3800" dirty="0" smtClean="0">
+                    <a:solidFill>
+                      <a:prstClr val="black"/>
+                    </a:solidFill>
+                  </a:rPr>
+                  <a:t>Keep track of execution and associated status to the corresponding commit</a:t>
+                </a:r>
+                <a:endParaRPr lang="en-US" sz="3800" dirty="0"/>
+              </a:p>
+            </p:txBody>
+          </p:sp>
+          <p:sp>
+            <p:nvSpPr>
+              <p:cNvPr id="125" name="Oval 124"/>
+              <p:cNvSpPr/>
+              <p:nvPr/>
+            </p:nvSpPr>
+            <p:spPr>
+              <a:xfrm>
+                <a:off x="3445130" y="3793413"/>
+                <a:ext cx="840106" cy="978563"/>
+              </a:xfrm>
+              <a:prstGeom prst="ellipse">
+                <a:avLst/>
+              </a:prstGeom>
+              <a:ln w="76200"/>
+            </p:spPr>
+            <p:style>
+              <a:lnRef idx="2">
+                <a:schemeClr val="dk1"/>
+              </a:lnRef>
+              <a:fillRef idx="1">
+                <a:schemeClr val="lt1"/>
+              </a:fillRef>
+              <a:effectRef idx="0">
+                <a:schemeClr val="dk1"/>
+              </a:effectRef>
+              <a:fontRef idx="minor">
+                <a:schemeClr val="dk1"/>
+              </a:fontRef>
+            </p:style>
+            <p:txBody>
+              <a:bodyPr rtlCol="0" anchor="ctr"/>
+              <a:lstStyle/>
+              <a:p>
+                <a:pPr algn="ctr"/>
+                <a:r>
+                  <a:rPr lang="en-US" sz="4800" b="1" dirty="0" smtClean="0"/>
+                  <a:t>6</a:t>
+                </a:r>
+                <a:endParaRPr lang="en-US" sz="4800" b="1" dirty="0"/>
+              </a:p>
+            </p:txBody>
+          </p:sp>
+        </p:grpSp>
       </p:grpSp>
     </p:spTree>
     <p:extLst>

</xml_diff>